<commit_message>
added Description controls to bluetooth and document; updated reactions and documentation accordingly; included examples of using BigEd to author.
</commit_message>
<xml_diff>
--- a/examples/bluetoothex/docs/images/Overview_images.pptx
+++ b/examples/bluetoothex/docs/images/Overview_images.pptx
@@ -294,7 +294,7 @@
             <a:fld id="{1D8BD707-D9CF-40AE-B4C6-C98DA3205C09}" type="datetimeFigureOut">
               <a:rPr lang="en-US" smtClean="0"/>
               <a:pPr/>
-              <a:t>8/27/2009</a:t>
+              <a:t>9/9/2009</a:t>
             </a:fld>
             <a:endParaRPr lang="en-US"/>
           </a:p>
@@ -461,7 +461,7 @@
             <a:fld id="{1D8BD707-D9CF-40AE-B4C6-C98DA3205C09}" type="datetimeFigureOut">
               <a:rPr lang="en-US" smtClean="0"/>
               <a:pPr/>
-              <a:t>8/27/2009</a:t>
+              <a:t>9/9/2009</a:t>
             </a:fld>
             <a:endParaRPr lang="en-US"/>
           </a:p>
@@ -638,7 +638,7 @@
             <a:fld id="{1D8BD707-D9CF-40AE-B4C6-C98DA3205C09}" type="datetimeFigureOut">
               <a:rPr lang="en-US" smtClean="0"/>
               <a:pPr/>
-              <a:t>8/27/2009</a:t>
+              <a:t>9/9/2009</a:t>
             </a:fld>
             <a:endParaRPr lang="en-US"/>
           </a:p>
@@ -805,7 +805,7 @@
             <a:fld id="{1D8BD707-D9CF-40AE-B4C6-C98DA3205C09}" type="datetimeFigureOut">
               <a:rPr lang="en-US" smtClean="0"/>
               <a:pPr/>
-              <a:t>8/27/2009</a:t>
+              <a:t>9/9/2009</a:t>
             </a:fld>
             <a:endParaRPr lang="en-US"/>
           </a:p>
@@ -1048,7 +1048,7 @@
             <a:fld id="{1D8BD707-D9CF-40AE-B4C6-C98DA3205C09}" type="datetimeFigureOut">
               <a:rPr lang="en-US" smtClean="0"/>
               <a:pPr/>
-              <a:t>8/27/2009</a:t>
+              <a:t>9/9/2009</a:t>
             </a:fld>
             <a:endParaRPr lang="en-US"/>
           </a:p>
@@ -1333,7 +1333,7 @@
             <a:fld id="{1D8BD707-D9CF-40AE-B4C6-C98DA3205C09}" type="datetimeFigureOut">
               <a:rPr lang="en-US" smtClean="0"/>
               <a:pPr/>
-              <a:t>8/27/2009</a:t>
+              <a:t>9/9/2009</a:t>
             </a:fld>
             <a:endParaRPr lang="en-US"/>
           </a:p>
@@ -1752,7 +1752,7 @@
             <a:fld id="{1D8BD707-D9CF-40AE-B4C6-C98DA3205C09}" type="datetimeFigureOut">
               <a:rPr lang="en-US" smtClean="0"/>
               <a:pPr/>
-              <a:t>8/27/2009</a:t>
+              <a:t>9/9/2009</a:t>
             </a:fld>
             <a:endParaRPr lang="en-US"/>
           </a:p>
@@ -1867,7 +1867,7 @@
             <a:fld id="{1D8BD707-D9CF-40AE-B4C6-C98DA3205C09}" type="datetimeFigureOut">
               <a:rPr lang="en-US" smtClean="0"/>
               <a:pPr/>
-              <a:t>8/27/2009</a:t>
+              <a:t>9/9/2009</a:t>
             </a:fld>
             <a:endParaRPr lang="en-US"/>
           </a:p>
@@ -1959,7 +1959,7 @@
             <a:fld id="{1D8BD707-D9CF-40AE-B4C6-C98DA3205C09}" type="datetimeFigureOut">
               <a:rPr lang="en-US" smtClean="0"/>
               <a:pPr/>
-              <a:t>8/27/2009</a:t>
+              <a:t>9/9/2009</a:t>
             </a:fld>
             <a:endParaRPr lang="en-US"/>
           </a:p>
@@ -2233,7 +2233,7 @@
             <a:fld id="{1D8BD707-D9CF-40AE-B4C6-C98DA3205C09}" type="datetimeFigureOut">
               <a:rPr lang="en-US" smtClean="0"/>
               <a:pPr/>
-              <a:t>8/27/2009</a:t>
+              <a:t>9/9/2009</a:t>
             </a:fld>
             <a:endParaRPr lang="en-US"/>
           </a:p>
@@ -2483,7 +2483,7 @@
             <a:fld id="{1D8BD707-D9CF-40AE-B4C6-C98DA3205C09}" type="datetimeFigureOut">
               <a:rPr lang="en-US" smtClean="0"/>
               <a:pPr/>
-              <a:t>8/27/2009</a:t>
+              <a:t>9/9/2009</a:t>
             </a:fld>
             <a:endParaRPr lang="en-US"/>
           </a:p>
@@ -2693,7 +2693,7 @@
             <a:fld id="{1D8BD707-D9CF-40AE-B4C6-C98DA3205C09}" type="datetimeFigureOut">
               <a:rPr lang="en-US" smtClean="0"/>
               <a:pPr/>
-              <a:t>8/27/2009</a:t>
+              <a:t>9/9/2009</a:t>
             </a:fld>
             <a:endParaRPr lang="en-US"/>
           </a:p>
@@ -3145,9 +3145,16 @@
             <p:ph type="title"/>
           </p:nvPr>
         </p:nvSpPr>
-        <p:spPr/>
-        <p:txBody>
-          <a:bodyPr/>
+        <p:spPr>
+          <a:xfrm>
+            <a:off x="457200" y="-76200"/>
+            <a:ext cx="8229600" cy="715962"/>
+          </a:xfrm>
+        </p:spPr>
+        <p:txBody>
+          <a:bodyPr>
+            <a:normAutofit fontScale="90000"/>
+          </a:bodyPr>
           <a:lstStyle/>
           <a:p>
             <a:r>
@@ -3229,8 +3236,8 @@
         </p:nvSpPr>
         <p:spPr>
           <a:xfrm>
-            <a:off x="4876800" y="1905000"/>
-            <a:ext cx="3962400" cy="4648200"/>
+            <a:off x="4876800" y="990600"/>
+            <a:ext cx="3962400" cy="5562600"/>
           </a:xfrm>
           <a:prstGeom prst="roundRect">
             <a:avLst>
@@ -3312,7 +3319,7 @@
         </p:nvSpPr>
         <p:spPr>
           <a:xfrm>
-            <a:off x="5048836" y="1535667"/>
+            <a:off x="5048836" y="621268"/>
             <a:ext cx="2342564" cy="369332"/>
           </a:xfrm>
           <a:prstGeom prst="rect">
@@ -3341,8 +3348,8 @@
         </p:nvSpPr>
         <p:spPr>
           <a:xfrm>
-            <a:off x="5105400" y="2526268"/>
-            <a:ext cx="3429000" cy="3645932"/>
+            <a:off x="5133392" y="1390260"/>
+            <a:ext cx="3429000" cy="5010539"/>
           </a:xfrm>
           <a:prstGeom prst="roundRect">
             <a:avLst>
@@ -3395,7 +3402,7 @@
         </p:nvSpPr>
         <p:spPr>
           <a:xfrm>
-            <a:off x="5204456" y="2156936"/>
+            <a:off x="5204456" y="1002268"/>
             <a:ext cx="1805944" cy="369332"/>
           </a:xfrm>
           <a:prstGeom prst="rect">
@@ -3424,11 +3431,13 @@
         </p:nvSpPr>
         <p:spPr>
           <a:xfrm>
-            <a:off x="5334000" y="2907268"/>
-            <a:ext cx="2895600" cy="1219200"/>
+            <a:off x="5334000" y="1752600"/>
+            <a:ext cx="2895600" cy="2133600"/>
           </a:xfrm>
           <a:prstGeom prst="roundRect">
-            <a:avLst/>
+            <a:avLst>
+              <a:gd name="adj" fmla="val 10982"/>
+            </a:avLst>
           </a:prstGeom>
           <a:solidFill>
             <a:schemeClr val="bg1"/>
@@ -3476,7 +3485,7 @@
         </p:nvSpPr>
         <p:spPr>
           <a:xfrm>
-            <a:off x="5356856" y="2537936"/>
+            <a:off x="5356856" y="1371600"/>
             <a:ext cx="2188741" cy="369332"/>
           </a:xfrm>
           <a:prstGeom prst="rect">
@@ -3505,7 +3514,7 @@
         </p:nvSpPr>
         <p:spPr>
           <a:xfrm>
-            <a:off x="5486400" y="3288268"/>
+            <a:off x="5486400" y="2121932"/>
             <a:ext cx="2514600" cy="685800"/>
           </a:xfrm>
           <a:prstGeom prst="roundRect">
@@ -3558,7 +3567,7 @@
         </p:nvSpPr>
         <p:spPr>
           <a:xfrm>
-            <a:off x="5509256" y="2918936"/>
+            <a:off x="5509256" y="1752600"/>
             <a:ext cx="933461" cy="369332"/>
           </a:xfrm>
           <a:prstGeom prst="rect">
@@ -3587,7 +3596,7 @@
         </p:nvSpPr>
         <p:spPr>
           <a:xfrm>
-            <a:off x="5715000" y="3440668"/>
+            <a:off x="5715000" y="2274332"/>
             <a:ext cx="2057400" cy="369332"/>
           </a:xfrm>
           <a:prstGeom prst="rect">
@@ -3607,15 +3616,7 @@
           <a:p>
             <a:r>
               <a:rPr lang="en-GB" dirty="0" smtClean="0"/>
-              <a:t>"00:1c:9a</a:t>
-            </a:r>
-            <a:r>
-              <a:rPr lang="en-GB" dirty="0" smtClean="0"/>
-              <a:t>:…":</a:t>
-            </a:r>
-            <a:r>
-              <a:rPr lang="en-GB" dirty="0" smtClean="0"/>
-              <a:t>string</a:t>
+              <a:t>"00:1c:9a:…":string</a:t>
             </a:r>
             <a:endParaRPr lang="en-GB" dirty="0"/>
           </a:p>
@@ -3629,11 +3630,13 @@
         </p:nvSpPr>
         <p:spPr>
           <a:xfrm>
-            <a:off x="5334000" y="4636532"/>
-            <a:ext cx="2895600" cy="1219200"/>
+            <a:off x="5334000" y="4267200"/>
+            <a:ext cx="2895600" cy="1981200"/>
           </a:xfrm>
           <a:prstGeom prst="roundRect">
-            <a:avLst/>
+            <a:avLst>
+              <a:gd name="adj" fmla="val 10074"/>
+            </a:avLst>
           </a:prstGeom>
           <a:solidFill>
             <a:schemeClr val="bg1"/>
@@ -3681,7 +3684,7 @@
         </p:nvSpPr>
         <p:spPr>
           <a:xfrm>
-            <a:off x="5356856" y="4267200"/>
+            <a:off x="5356856" y="3886200"/>
             <a:ext cx="1760290" cy="369332"/>
           </a:xfrm>
           <a:prstGeom prst="rect">
@@ -3710,7 +3713,7 @@
         </p:nvSpPr>
         <p:spPr>
           <a:xfrm>
-            <a:off x="5486400" y="5017532"/>
+            <a:off x="5486400" y="4636532"/>
             <a:ext cx="2514600" cy="685800"/>
           </a:xfrm>
           <a:prstGeom prst="roundRect">
@@ -3763,7 +3766,7 @@
         </p:nvSpPr>
         <p:spPr>
           <a:xfrm>
-            <a:off x="5509256" y="4648200"/>
+            <a:off x="5509256" y="4267200"/>
             <a:ext cx="1043876" cy="369332"/>
           </a:xfrm>
           <a:prstGeom prst="rect">
@@ -3792,7 +3795,7 @@
         </p:nvSpPr>
         <p:spPr>
           <a:xfrm>
-            <a:off x="5715000" y="5169932"/>
+            <a:off x="5715000" y="4788932"/>
             <a:ext cx="2057400" cy="369332"/>
           </a:xfrm>
           <a:prstGeom prst="rect">
@@ -3812,15 +3815,7 @@
           <a:p>
             <a:r>
               <a:rPr lang="en-GB" dirty="0" smtClean="0"/>
-              <a:t>"http</a:t>
-            </a:r>
-            <a:r>
-              <a:rPr lang="en-GB" dirty="0" smtClean="0"/>
-              <a:t>://ww..":</a:t>
-            </a:r>
-            <a:r>
-              <a:rPr lang="en-GB" dirty="0" smtClean="0"/>
-              <a:t>string</a:t>
+              <a:t>"http://ww..":string</a:t>
             </a:r>
             <a:endParaRPr lang="en-GB" dirty="0"/>
           </a:p>
@@ -3931,6 +3926,246 @@
                 <a:schemeClr val="tx1"/>
               </a:solidFill>
             </a:endParaRPr>
+          </a:p>
+        </p:txBody>
+      </p:sp>
+      <p:sp>
+        <p:nvSpPr>
+          <p:cNvPr id="24" name="Rounded Rectangle 23"/>
+          <p:cNvSpPr/>
+          <p:nvPr/>
+        </p:nvSpPr>
+        <p:spPr>
+          <a:xfrm>
+            <a:off x="5486400" y="5596354"/>
+            <a:ext cx="2514600" cy="499646"/>
+          </a:xfrm>
+          <a:prstGeom prst="roundRect">
+            <a:avLst/>
+          </a:prstGeom>
+          <a:solidFill>
+            <a:schemeClr val="bg1"/>
+          </a:solidFill>
+          <a:ln>
+            <a:solidFill>
+              <a:schemeClr val="tx1"/>
+            </a:solidFill>
+            <a:prstDash val="sysDot"/>
+          </a:ln>
+        </p:spPr>
+        <p:style>
+          <a:lnRef idx="2">
+            <a:schemeClr val="accent1">
+              <a:shade val="50000"/>
+            </a:schemeClr>
+          </a:lnRef>
+          <a:fillRef idx="1">
+            <a:schemeClr val="accent1"/>
+          </a:fillRef>
+          <a:effectRef idx="0">
+            <a:schemeClr val="accent1"/>
+          </a:effectRef>
+          <a:fontRef idx="minor">
+            <a:schemeClr val="lt1"/>
+          </a:fontRef>
+        </p:style>
+        <p:txBody>
+          <a:bodyPr rtlCol="0" anchor="ctr"/>
+          <a:lstStyle/>
+          <a:p>
+            <a:pPr algn="ctr"/>
+            <a:endParaRPr lang="en-GB" dirty="0">
+              <a:solidFill>
+                <a:schemeClr val="tx1"/>
+              </a:solidFill>
+            </a:endParaRPr>
+          </a:p>
+        </p:txBody>
+      </p:sp>
+      <p:sp>
+        <p:nvSpPr>
+          <p:cNvPr id="25" name="Rectangle 24"/>
+          <p:cNvSpPr/>
+          <p:nvPr/>
+        </p:nvSpPr>
+        <p:spPr>
+          <a:xfrm>
+            <a:off x="5509256" y="5291554"/>
+            <a:ext cx="1137556" cy="338554"/>
+          </a:xfrm>
+          <a:prstGeom prst="rect">
+            <a:avLst/>
+          </a:prstGeom>
+        </p:spPr>
+        <p:txBody>
+          <a:bodyPr wrap="none">
+            <a:spAutoFit/>
+          </a:bodyPr>
+          <a:lstStyle/>
+          <a:p>
+            <a:r>
+              <a:rPr lang="en-GB" sz="1600" dirty="0" smtClean="0"/>
+              <a:t>Description</a:t>
+            </a:r>
+            <a:endParaRPr lang="en-GB" sz="1600" dirty="0"/>
+          </a:p>
+        </p:txBody>
+      </p:sp>
+      <p:sp>
+        <p:nvSpPr>
+          <p:cNvPr id="35" name="Rectangle 34"/>
+          <p:cNvSpPr/>
+          <p:nvPr/>
+        </p:nvSpPr>
+        <p:spPr>
+          <a:xfrm>
+            <a:off x="5715000" y="5715000"/>
+            <a:ext cx="2133600" cy="307777"/>
+          </a:xfrm>
+          <a:prstGeom prst="rect">
+            <a:avLst/>
+          </a:prstGeom>
+          <a:ln>
+            <a:solidFill>
+              <a:schemeClr val="tx1"/>
+            </a:solidFill>
+          </a:ln>
+        </p:spPr>
+        <p:txBody>
+          <a:bodyPr wrap="square">
+            <a:spAutoFit/>
+          </a:bodyPr>
+          <a:lstStyle/>
+          <a:p>
+            <a:r>
+              <a:rPr lang="en-GB" sz="1400" dirty="0" smtClean="0"/>
+              <a:t>"</a:t>
+            </a:r>
+            <a:r>
+              <a:rPr lang="en-GB" sz="1400" dirty="0" smtClean="0"/>
+              <a:t>Chris’s home page":string</a:t>
+            </a:r>
+            <a:endParaRPr lang="en-GB" sz="1400" dirty="0"/>
+          </a:p>
+        </p:txBody>
+      </p:sp>
+      <p:sp>
+        <p:nvSpPr>
+          <p:cNvPr id="36" name="Rounded Rectangle 35"/>
+          <p:cNvSpPr/>
+          <p:nvPr/>
+        </p:nvSpPr>
+        <p:spPr>
+          <a:xfrm>
+            <a:off x="5486400" y="3124200"/>
+            <a:ext cx="2514600" cy="533400"/>
+          </a:xfrm>
+          <a:prstGeom prst="roundRect">
+            <a:avLst/>
+          </a:prstGeom>
+          <a:solidFill>
+            <a:schemeClr val="bg1"/>
+          </a:solidFill>
+          <a:ln>
+            <a:solidFill>
+              <a:schemeClr val="tx1"/>
+            </a:solidFill>
+            <a:prstDash val="sysDot"/>
+          </a:ln>
+        </p:spPr>
+        <p:style>
+          <a:lnRef idx="2">
+            <a:schemeClr val="accent1">
+              <a:shade val="50000"/>
+            </a:schemeClr>
+          </a:lnRef>
+          <a:fillRef idx="1">
+            <a:schemeClr val="accent1"/>
+          </a:fillRef>
+          <a:effectRef idx="0">
+            <a:schemeClr val="accent1"/>
+          </a:effectRef>
+          <a:fontRef idx="minor">
+            <a:schemeClr val="lt1"/>
+          </a:fontRef>
+        </p:style>
+        <p:txBody>
+          <a:bodyPr rtlCol="0" anchor="ctr"/>
+          <a:lstStyle/>
+          <a:p>
+            <a:pPr algn="ctr"/>
+            <a:endParaRPr lang="en-GB" dirty="0">
+              <a:solidFill>
+                <a:schemeClr val="tx1"/>
+              </a:solidFill>
+            </a:endParaRPr>
+          </a:p>
+        </p:txBody>
+      </p:sp>
+      <p:sp>
+        <p:nvSpPr>
+          <p:cNvPr id="42" name="Rectangle 41"/>
+          <p:cNvSpPr/>
+          <p:nvPr/>
+        </p:nvSpPr>
+        <p:spPr>
+          <a:xfrm>
+            <a:off x="5509256" y="2819400"/>
+            <a:ext cx="1137556" cy="338554"/>
+          </a:xfrm>
+          <a:prstGeom prst="rect">
+            <a:avLst/>
+          </a:prstGeom>
+        </p:spPr>
+        <p:txBody>
+          <a:bodyPr wrap="none">
+            <a:spAutoFit/>
+          </a:bodyPr>
+          <a:lstStyle/>
+          <a:p>
+            <a:r>
+              <a:rPr lang="en-GB" sz="1600" dirty="0" smtClean="0"/>
+              <a:t>Description</a:t>
+            </a:r>
+            <a:endParaRPr lang="en-GB" sz="1600" dirty="0"/>
+          </a:p>
+        </p:txBody>
+      </p:sp>
+      <p:sp>
+        <p:nvSpPr>
+          <p:cNvPr id="43" name="Rectangle 42"/>
+          <p:cNvSpPr/>
+          <p:nvPr/>
+        </p:nvSpPr>
+        <p:spPr>
+          <a:xfrm>
+            <a:off x="5715000" y="3242846"/>
+            <a:ext cx="2133600" cy="307777"/>
+          </a:xfrm>
+          <a:prstGeom prst="rect">
+            <a:avLst/>
+          </a:prstGeom>
+          <a:ln>
+            <a:solidFill>
+              <a:schemeClr val="tx1"/>
+            </a:solidFill>
+          </a:ln>
+        </p:spPr>
+        <p:txBody>
+          <a:bodyPr wrap="square">
+            <a:spAutoFit/>
+          </a:bodyPr>
+          <a:lstStyle/>
+          <a:p>
+            <a:r>
+              <a:rPr lang="en-GB" sz="1400" dirty="0" smtClean="0"/>
+              <a:t>"</a:t>
+            </a:r>
+            <a:r>
+              <a:rPr lang="en-GB" sz="1400" dirty="0" smtClean="0"/>
+              <a:t>Chris’s phone":string</a:t>
+            </a:r>
+            <a:endParaRPr lang="en-GB" sz="1400" dirty="0"/>
           </a:p>
         </p:txBody>
       </p:sp>
@@ -4315,15 +4550,7 @@
           <a:p>
             <a:r>
               <a:rPr lang="en-GB" dirty="0" smtClean="0"/>
-              <a:t>"00:1c:9a</a:t>
-            </a:r>
-            <a:r>
-              <a:rPr lang="en-GB" dirty="0" smtClean="0"/>
-              <a:t>:…":</a:t>
-            </a:r>
-            <a:r>
-              <a:rPr lang="en-GB" dirty="0" smtClean="0"/>
-              <a:t>string</a:t>
+              <a:t>"00:1c:9a:…":string</a:t>
             </a:r>
             <a:endParaRPr lang="en-GB" dirty="0"/>
           </a:p>
@@ -4430,7 +4657,7 @@
           <a:lstStyle/>
           <a:p>
             <a:pPr algn="ctr"/>
-            <a:endParaRPr lang="en-GB"/>
+            <a:endParaRPr lang="en-GB" dirty="0"/>
           </a:p>
         </p:txBody>
       </p:sp>
@@ -4501,18 +4728,19 @@
             <p:ph type="title"/>
           </p:nvPr>
         </p:nvSpPr>
-        <p:spPr/>
+        <p:spPr>
+          <a:xfrm>
+            <a:off x="457200" y="0"/>
+            <a:ext cx="8229600" cy="792162"/>
+          </a:xfrm>
+        </p:spPr>
         <p:txBody>
           <a:bodyPr/>
           <a:lstStyle/>
           <a:p>
             <a:r>
               <a:rPr lang="en-GB" dirty="0" smtClean="0"/>
-              <a:t>Behaviour </a:t>
-            </a:r>
-            <a:r>
-              <a:rPr lang="en-GB" dirty="0" err="1" smtClean="0"/>
-              <a:t>redex</a:t>
+              <a:t>Behaviour redex</a:t>
             </a:r>
             <a:endParaRPr lang="en-GB" dirty="0"/>
           </a:p>
@@ -4585,8 +4813,8 @@
         </p:nvSpPr>
         <p:spPr>
           <a:xfrm>
-            <a:off x="4876800" y="1524000"/>
-            <a:ext cx="3962400" cy="5181600"/>
+            <a:off x="4876800" y="1219200"/>
+            <a:ext cx="3962400" cy="5486400"/>
           </a:xfrm>
           <a:prstGeom prst="roundRect">
             <a:avLst>
@@ -4668,7 +4896,7 @@
         </p:nvSpPr>
         <p:spPr>
           <a:xfrm>
-            <a:off x="5048836" y="1154667"/>
+            <a:off x="5048836" y="838200"/>
             <a:ext cx="2342564" cy="369332"/>
           </a:xfrm>
           <a:prstGeom prst="rect">
@@ -4697,8 +4925,8 @@
         </p:nvSpPr>
         <p:spPr>
           <a:xfrm>
-            <a:off x="5105400" y="2145268"/>
-            <a:ext cx="3429000" cy="3645932"/>
+            <a:off x="5105400" y="1676400"/>
+            <a:ext cx="3429000" cy="4114800"/>
           </a:xfrm>
           <a:prstGeom prst="roundRect">
             <a:avLst>
@@ -4751,7 +4979,7 @@
         </p:nvSpPr>
         <p:spPr>
           <a:xfrm>
-            <a:off x="5204456" y="1775936"/>
+            <a:off x="5204456" y="1295400"/>
             <a:ext cx="1805944" cy="369332"/>
           </a:xfrm>
           <a:prstGeom prst="rect">
@@ -4780,11 +5008,13 @@
         </p:nvSpPr>
         <p:spPr>
           <a:xfrm>
-            <a:off x="5334000" y="2526268"/>
-            <a:ext cx="2895600" cy="1219200"/>
+            <a:off x="5334000" y="2121932"/>
+            <a:ext cx="2895600" cy="1764268"/>
           </a:xfrm>
           <a:prstGeom prst="roundRect">
-            <a:avLst/>
+            <a:avLst>
+              <a:gd name="adj" fmla="val 9705"/>
+            </a:avLst>
           </a:prstGeom>
           <a:solidFill>
             <a:schemeClr val="bg1"/>
@@ -4832,7 +5062,7 @@
         </p:nvSpPr>
         <p:spPr>
           <a:xfrm>
-            <a:off x="5356856" y="2156936"/>
+            <a:off x="5356856" y="1752600"/>
             <a:ext cx="2188741" cy="369332"/>
           </a:xfrm>
           <a:prstGeom prst="rect">
@@ -4861,7 +5091,7 @@
         </p:nvSpPr>
         <p:spPr>
           <a:xfrm>
-            <a:off x="5486400" y="2907268"/>
+            <a:off x="5486400" y="2502932"/>
             <a:ext cx="2514600" cy="685800"/>
           </a:xfrm>
           <a:prstGeom prst="roundRect">
@@ -4914,7 +5144,7 @@
         </p:nvSpPr>
         <p:spPr>
           <a:xfrm>
-            <a:off x="5509256" y="2537936"/>
+            <a:off x="5509256" y="2133600"/>
             <a:ext cx="933461" cy="369332"/>
           </a:xfrm>
           <a:prstGeom prst="rect">
@@ -4943,7 +5173,7 @@
         </p:nvSpPr>
         <p:spPr>
           <a:xfrm>
-            <a:off x="5715000" y="3059668"/>
+            <a:off x="5715000" y="2655332"/>
             <a:ext cx="2057400" cy="369332"/>
           </a:xfrm>
           <a:prstGeom prst="rect">
@@ -4977,8 +5207,8 @@
         </p:nvSpPr>
         <p:spPr>
           <a:xfrm>
-            <a:off x="5334000" y="4255532"/>
-            <a:ext cx="2895600" cy="1219200"/>
+            <a:off x="5334000" y="4343400"/>
+            <a:ext cx="2895600" cy="1131332"/>
           </a:xfrm>
           <a:prstGeom prst="roundRect">
             <a:avLst/>
@@ -5029,7 +5259,7 @@
         </p:nvSpPr>
         <p:spPr>
           <a:xfrm>
-            <a:off x="5356856" y="3886200"/>
+            <a:off x="5356856" y="3974068"/>
             <a:ext cx="1760290" cy="369332"/>
           </a:xfrm>
           <a:prstGeom prst="rect">
@@ -5418,8 +5648,8 @@
         </p:nvSpPr>
         <p:spPr>
           <a:xfrm>
-            <a:off x="5562600" y="4495800"/>
-            <a:ext cx="2362200" cy="762000"/>
+            <a:off x="5562600" y="4572000"/>
+            <a:ext cx="2362200" cy="685800"/>
           </a:xfrm>
           <a:prstGeom prst="roundRect">
             <a:avLst/>
@@ -5570,6 +5800,61 @@
             <a:r>
               <a:rPr lang="en-GB" dirty="0" smtClean="0"/>
               <a:t>[1]</a:t>
+            </a:r>
+            <a:endParaRPr lang="en-GB" dirty="0"/>
+          </a:p>
+        </p:txBody>
+      </p:sp>
+      <p:sp>
+        <p:nvSpPr>
+          <p:cNvPr id="39" name="Rounded Rectangle 38"/>
+          <p:cNvSpPr/>
+          <p:nvPr/>
+        </p:nvSpPr>
+        <p:spPr>
+          <a:xfrm>
+            <a:off x="5486400" y="3352800"/>
+            <a:ext cx="2514600" cy="381000"/>
+          </a:xfrm>
+          <a:prstGeom prst="roundRect">
+            <a:avLst/>
+          </a:prstGeom>
+          <a:solidFill>
+            <a:schemeClr val="bg1">
+              <a:lumMod val="65000"/>
+            </a:schemeClr>
+          </a:solidFill>
+          <a:ln>
+            <a:solidFill>
+              <a:schemeClr val="tx1"/>
+            </a:solidFill>
+            <a:prstDash val="sysDash"/>
+          </a:ln>
+        </p:spPr>
+        <p:style>
+          <a:lnRef idx="2">
+            <a:schemeClr val="accent1">
+              <a:shade val="50000"/>
+            </a:schemeClr>
+          </a:lnRef>
+          <a:fillRef idx="1">
+            <a:schemeClr val="accent1"/>
+          </a:fillRef>
+          <a:effectRef idx="0">
+            <a:schemeClr val="accent1"/>
+          </a:effectRef>
+          <a:fontRef idx="minor">
+            <a:schemeClr val="lt1"/>
+          </a:fontRef>
+        </p:style>
+        <p:txBody>
+          <a:bodyPr rtlCol="0" anchor="ctr"/>
+          <a:lstStyle/>
+          <a:p>
+            <a:pPr algn="ctr"/>
+            <a:r>
+              <a:rPr lang="en-GB" dirty="0" smtClean="0"/>
+              <a:t>[5]</a:t>
             </a:r>
             <a:endParaRPr lang="en-GB" dirty="0"/>
           </a:p>
@@ -5610,9 +5895,16 @@
             <p:ph type="title"/>
           </p:nvPr>
         </p:nvSpPr>
-        <p:spPr/>
-        <p:txBody>
-          <a:bodyPr/>
+        <p:spPr>
+          <a:xfrm>
+            <a:off x="457200" y="76200"/>
+            <a:ext cx="8229600" cy="639762"/>
+          </a:xfrm>
+        </p:spPr>
+        <p:txBody>
+          <a:bodyPr>
+            <a:normAutofit fontScale="90000"/>
+          </a:bodyPr>
           <a:lstStyle/>
           <a:p>
             <a:r>
@@ -5688,18 +5980,47 @@
       </p:sp>
       <p:sp>
         <p:nvSpPr>
-          <p:cNvPr id="23" name="Rounded Rectangle 22"/>
-          <p:cNvSpPr/>
-          <p:nvPr/>
-        </p:nvSpPr>
-        <p:spPr>
-          <a:xfrm>
-            <a:off x="4876800" y="1524000"/>
-            <a:ext cx="3962400" cy="5181600"/>
+          <p:cNvPr id="26" name="Rectangle 25"/>
+          <p:cNvSpPr/>
+          <p:nvPr/>
+        </p:nvSpPr>
+        <p:spPr>
+          <a:xfrm>
+            <a:off x="969006" y="1219200"/>
+            <a:ext cx="2086084" cy="369332"/>
+          </a:xfrm>
+          <a:prstGeom prst="rect">
+            <a:avLst/>
+          </a:prstGeom>
+        </p:spPr>
+        <p:txBody>
+          <a:bodyPr wrap="none">
+            <a:spAutoFit/>
+          </a:bodyPr>
+          <a:lstStyle/>
+          <a:p>
+            <a:r>
+              <a:rPr lang="en-GB" dirty="0" smtClean="0"/>
+              <a:t>BigraphSpaceScreen</a:t>
+            </a:r>
+            <a:endParaRPr lang="en-GB" dirty="0"/>
+          </a:p>
+        </p:txBody>
+      </p:sp>
+      <p:sp>
+        <p:nvSpPr>
+          <p:cNvPr id="45" name="Rounded Rectangle 44"/>
+          <p:cNvSpPr/>
+          <p:nvPr/>
+        </p:nvSpPr>
+        <p:spPr>
+          <a:xfrm>
+            <a:off x="762000" y="4191000"/>
+            <a:ext cx="3429000" cy="2514600"/>
           </a:xfrm>
           <a:prstGeom prst="roundRect">
             <a:avLst>
-              <a:gd name="adj" fmla="val 5978"/>
+              <a:gd name="adj" fmla="val 8187"/>
             </a:avLst>
           </a:prstGeom>
           <a:solidFill>
@@ -5742,158 +6063,19 @@
       </p:sp>
       <p:sp>
         <p:nvSpPr>
-          <p:cNvPr id="26" name="Rectangle 25"/>
-          <p:cNvSpPr/>
-          <p:nvPr/>
-        </p:nvSpPr>
-        <p:spPr>
-          <a:xfrm>
-            <a:off x="969006" y="1219200"/>
-            <a:ext cx="2086084" cy="369332"/>
-          </a:xfrm>
-          <a:prstGeom prst="rect">
-            <a:avLst/>
-          </a:prstGeom>
-        </p:spPr>
-        <p:txBody>
-          <a:bodyPr wrap="none">
-            <a:spAutoFit/>
-          </a:bodyPr>
-          <a:lstStyle/>
-          <a:p>
-            <a:r>
-              <a:rPr lang="en-GB" dirty="0" smtClean="0"/>
-              <a:t>BigraphSpaceScreen</a:t>
-            </a:r>
-            <a:endParaRPr lang="en-GB" dirty="0"/>
-          </a:p>
-        </p:txBody>
-      </p:sp>
-      <p:sp>
-        <p:nvSpPr>
-          <p:cNvPr id="27" name="Rectangle 26"/>
-          <p:cNvSpPr/>
-          <p:nvPr/>
-        </p:nvSpPr>
-        <p:spPr>
-          <a:xfrm>
-            <a:off x="5048836" y="1154667"/>
-            <a:ext cx="2342564" cy="369332"/>
-          </a:xfrm>
-          <a:prstGeom prst="rect">
-            <a:avLst/>
-          </a:prstGeom>
-        </p:spPr>
-        <p:txBody>
-          <a:bodyPr wrap="square">
-            <a:spAutoFit/>
-          </a:bodyPr>
-          <a:lstStyle/>
-          <a:p>
-            <a:r>
-              <a:rPr lang="en-GB" dirty="0" smtClean="0"/>
-              <a:t>BigraphSpaceAuthored</a:t>
-            </a:r>
-            <a:endParaRPr lang="en-GB" dirty="0"/>
-          </a:p>
-        </p:txBody>
-      </p:sp>
-      <p:sp>
-        <p:nvSpPr>
-          <p:cNvPr id="28" name="Rounded Rectangle 27"/>
-          <p:cNvSpPr/>
-          <p:nvPr/>
-        </p:nvSpPr>
-        <p:spPr>
-          <a:xfrm>
-            <a:off x="5105400" y="2145268"/>
-            <a:ext cx="3429000" cy="3645932"/>
+          <p:cNvPr id="46" name="Rounded Rectangle 45"/>
+          <p:cNvSpPr/>
+          <p:nvPr/>
+        </p:nvSpPr>
+        <p:spPr>
+          <a:xfrm>
+            <a:off x="762000" y="1676400"/>
+            <a:ext cx="3429000" cy="1905000"/>
           </a:xfrm>
           <a:prstGeom prst="roundRect">
             <a:avLst>
-              <a:gd name="adj" fmla="val 6560"/>
+              <a:gd name="adj" fmla="val 11443"/>
             </a:avLst>
-          </a:prstGeom>
-          <a:solidFill>
-            <a:schemeClr val="bg1"/>
-          </a:solidFill>
-          <a:ln cmpd="dbl">
-            <a:solidFill>
-              <a:schemeClr val="tx1"/>
-            </a:solidFill>
-          </a:ln>
-        </p:spPr>
-        <p:style>
-          <a:lnRef idx="2">
-            <a:schemeClr val="accent1">
-              <a:shade val="50000"/>
-            </a:schemeClr>
-          </a:lnRef>
-          <a:fillRef idx="1">
-            <a:schemeClr val="accent1"/>
-          </a:fillRef>
-          <a:effectRef idx="0">
-            <a:schemeClr val="accent1"/>
-          </a:effectRef>
-          <a:fontRef idx="minor">
-            <a:schemeClr val="lt1"/>
-          </a:fontRef>
-        </p:style>
-        <p:txBody>
-          <a:bodyPr rtlCol="0" anchor="ctr"/>
-          <a:lstStyle/>
-          <a:p>
-            <a:pPr algn="ctr"/>
-            <a:endParaRPr lang="en-GB" dirty="0">
-              <a:solidFill>
-                <a:schemeClr val="tx1"/>
-              </a:solidFill>
-            </a:endParaRPr>
-          </a:p>
-        </p:txBody>
-      </p:sp>
-      <p:sp>
-        <p:nvSpPr>
-          <p:cNvPr id="29" name="Rectangle 28"/>
-          <p:cNvSpPr/>
-          <p:nvPr/>
-        </p:nvSpPr>
-        <p:spPr>
-          <a:xfrm>
-            <a:off x="5204456" y="1775936"/>
-            <a:ext cx="1805944" cy="369332"/>
-          </a:xfrm>
-          <a:prstGeom prst="rect">
-            <a:avLst/>
-          </a:prstGeom>
-        </p:spPr>
-        <p:txBody>
-          <a:bodyPr wrap="none">
-            <a:spAutoFit/>
-          </a:bodyPr>
-          <a:lstStyle/>
-          <a:p>
-            <a:r>
-              <a:rPr lang="en-GB" dirty="0" smtClean="0"/>
-              <a:t>DescriptionRoom</a:t>
-            </a:r>
-            <a:endParaRPr lang="en-GB" dirty="0"/>
-          </a:p>
-        </p:txBody>
-      </p:sp>
-      <p:sp>
-        <p:nvSpPr>
-          <p:cNvPr id="30" name="Rounded Rectangle 29"/>
-          <p:cNvSpPr/>
-          <p:nvPr/>
-        </p:nvSpPr>
-        <p:spPr>
-          <a:xfrm>
-            <a:off x="5334000" y="2526268"/>
-            <a:ext cx="2895600" cy="1219200"/>
-          </a:xfrm>
-          <a:prstGeom prst="roundRect">
-            <a:avLst/>
           </a:prstGeom>
           <a:solidFill>
             <a:schemeClr val="bg1"/>
@@ -5935,348 +6117,14 @@
       </p:sp>
       <p:sp>
         <p:nvSpPr>
-          <p:cNvPr id="31" name="Rectangle 30"/>
-          <p:cNvSpPr/>
-          <p:nvPr/>
-        </p:nvSpPr>
-        <p:spPr>
-          <a:xfrm>
-            <a:off x="5356856" y="2156936"/>
-            <a:ext cx="2188741" cy="369332"/>
-          </a:xfrm>
-          <a:prstGeom prst="rect">
-            <a:avLst/>
-          </a:prstGeom>
-        </p:spPr>
-        <p:txBody>
-          <a:bodyPr wrap="none">
-            <a:spAutoFit/>
-          </a:bodyPr>
-          <a:lstStyle/>
-          <a:p>
-            <a:r>
-              <a:rPr lang="en-GB" dirty="0" smtClean="0"/>
-              <a:t>DescriptionBluetooth</a:t>
-            </a:r>
-            <a:endParaRPr lang="en-GB" dirty="0"/>
-          </a:p>
-        </p:txBody>
-      </p:sp>
-      <p:sp>
-        <p:nvSpPr>
-          <p:cNvPr id="32" name="Rounded Rectangle 31"/>
-          <p:cNvSpPr/>
-          <p:nvPr/>
-        </p:nvSpPr>
-        <p:spPr>
-          <a:xfrm>
-            <a:off x="5486400" y="2907268"/>
-            <a:ext cx="2514600" cy="685800"/>
-          </a:xfrm>
-          <a:prstGeom prst="roundRect">
-            <a:avLst/>
-          </a:prstGeom>
-          <a:solidFill>
-            <a:schemeClr val="bg1"/>
-          </a:solidFill>
-          <a:ln>
-            <a:solidFill>
-              <a:schemeClr val="tx1"/>
-            </a:solidFill>
-            <a:prstDash val="sysDot"/>
-          </a:ln>
-        </p:spPr>
-        <p:style>
-          <a:lnRef idx="2">
-            <a:schemeClr val="accent1">
-              <a:shade val="50000"/>
-            </a:schemeClr>
-          </a:lnRef>
-          <a:fillRef idx="1">
-            <a:schemeClr val="accent1"/>
-          </a:fillRef>
-          <a:effectRef idx="0">
-            <a:schemeClr val="accent1"/>
-          </a:effectRef>
-          <a:fontRef idx="minor">
-            <a:schemeClr val="lt1"/>
-          </a:fontRef>
-        </p:style>
-        <p:txBody>
-          <a:bodyPr rtlCol="0" anchor="ctr"/>
-          <a:lstStyle/>
-          <a:p>
-            <a:pPr algn="ctr"/>
-            <a:endParaRPr lang="en-GB" dirty="0">
-              <a:solidFill>
-                <a:schemeClr val="tx1"/>
-              </a:solidFill>
-            </a:endParaRPr>
-          </a:p>
-        </p:txBody>
-      </p:sp>
-      <p:sp>
-        <p:nvSpPr>
-          <p:cNvPr id="33" name="Rectangle 32"/>
-          <p:cNvSpPr/>
-          <p:nvPr/>
-        </p:nvSpPr>
-        <p:spPr>
-          <a:xfrm>
-            <a:off x="5509256" y="2537936"/>
-            <a:ext cx="933461" cy="369332"/>
-          </a:xfrm>
-          <a:prstGeom prst="rect">
-            <a:avLst/>
-          </a:prstGeom>
-        </p:spPr>
-        <p:txBody>
-          <a:bodyPr wrap="none">
-            <a:spAutoFit/>
-          </a:bodyPr>
-          <a:lstStyle/>
-          <a:p>
-            <a:r>
-              <a:rPr lang="en-GB" dirty="0" smtClean="0"/>
-              <a:t>Address</a:t>
-            </a:r>
-            <a:endParaRPr lang="en-GB" dirty="0"/>
-          </a:p>
-        </p:txBody>
-      </p:sp>
-      <p:sp>
-        <p:nvSpPr>
-          <p:cNvPr id="34" name="Rectangle 33"/>
-          <p:cNvSpPr/>
-          <p:nvPr/>
-        </p:nvSpPr>
-        <p:spPr>
-          <a:xfrm>
-            <a:off x="5715000" y="3059668"/>
-            <a:ext cx="2057400" cy="369332"/>
-          </a:xfrm>
-          <a:prstGeom prst="rect">
-            <a:avLst/>
-          </a:prstGeom>
-          <a:ln>
-            <a:solidFill>
-              <a:schemeClr val="tx1"/>
-            </a:solidFill>
-          </a:ln>
-        </p:spPr>
-        <p:txBody>
-          <a:bodyPr wrap="square">
-            <a:spAutoFit/>
-          </a:bodyPr>
-          <a:lstStyle/>
-          <a:p>
-            <a:r>
-              <a:rPr lang="en-GB" dirty="0" smtClean="0"/>
-              <a:t>$address:string</a:t>
-            </a:r>
-            <a:endParaRPr lang="en-GB" dirty="0"/>
-          </a:p>
-        </p:txBody>
-      </p:sp>
-      <p:sp>
-        <p:nvSpPr>
-          <p:cNvPr id="37" name="Rounded Rectangle 36"/>
-          <p:cNvSpPr/>
-          <p:nvPr/>
-        </p:nvSpPr>
-        <p:spPr>
-          <a:xfrm>
-            <a:off x="5334000" y="4255532"/>
-            <a:ext cx="2895600" cy="1219200"/>
-          </a:xfrm>
-          <a:prstGeom prst="roundRect">
-            <a:avLst/>
-          </a:prstGeom>
-          <a:solidFill>
-            <a:schemeClr val="bg1"/>
-          </a:solidFill>
-          <a:ln>
-            <a:solidFill>
-              <a:schemeClr val="tx1"/>
-            </a:solidFill>
-          </a:ln>
-        </p:spPr>
-        <p:style>
-          <a:lnRef idx="2">
-            <a:schemeClr val="accent1">
-              <a:shade val="50000"/>
-            </a:schemeClr>
-          </a:lnRef>
-          <a:fillRef idx="1">
-            <a:schemeClr val="accent1"/>
-          </a:fillRef>
-          <a:effectRef idx="0">
-            <a:schemeClr val="accent1"/>
-          </a:effectRef>
-          <a:fontRef idx="minor">
-            <a:schemeClr val="lt1"/>
-          </a:fontRef>
-        </p:style>
-        <p:txBody>
-          <a:bodyPr rtlCol="0" anchor="ctr"/>
-          <a:lstStyle/>
-          <a:p>
-            <a:pPr algn="ctr"/>
-            <a:endParaRPr lang="en-GB" dirty="0">
-              <a:solidFill>
-                <a:schemeClr val="tx1"/>
-              </a:solidFill>
-            </a:endParaRPr>
-          </a:p>
-        </p:txBody>
-      </p:sp>
-      <p:sp>
-        <p:nvSpPr>
-          <p:cNvPr id="38" name="Rectangle 37"/>
-          <p:cNvSpPr/>
-          <p:nvPr/>
-        </p:nvSpPr>
-        <p:spPr>
-          <a:xfrm>
-            <a:off x="5356856" y="3886200"/>
-            <a:ext cx="1760290" cy="369332"/>
-          </a:xfrm>
-          <a:prstGeom prst="rect">
-            <a:avLst/>
-          </a:prstGeom>
-        </p:spPr>
-        <p:txBody>
-          <a:bodyPr wrap="none">
-            <a:spAutoFit/>
-          </a:bodyPr>
-          <a:lstStyle/>
-          <a:p>
-            <a:r>
-              <a:rPr lang="en-GB" dirty="0" smtClean="0"/>
-              <a:t>DigitalDocument</a:t>
-            </a:r>
-            <a:endParaRPr lang="en-GB" dirty="0"/>
-          </a:p>
-        </p:txBody>
-      </p:sp>
-      <p:sp>
-        <p:nvSpPr>
-          <p:cNvPr id="45" name="Rounded Rectangle 44"/>
-          <p:cNvSpPr/>
-          <p:nvPr/>
-        </p:nvSpPr>
-        <p:spPr>
-          <a:xfrm>
-            <a:off x="762000" y="4191000"/>
-            <a:ext cx="3429000" cy="2514600"/>
-          </a:xfrm>
-          <a:prstGeom prst="roundRect">
-            <a:avLst>
-              <a:gd name="adj" fmla="val 8187"/>
-            </a:avLst>
-          </a:prstGeom>
-          <a:solidFill>
-            <a:schemeClr val="bg1"/>
-          </a:solidFill>
-          <a:ln>
-            <a:solidFill>
-              <a:schemeClr val="tx1"/>
-            </a:solidFill>
-          </a:ln>
-        </p:spPr>
-        <p:style>
-          <a:lnRef idx="2">
-            <a:schemeClr val="accent1">
-              <a:shade val="50000"/>
-            </a:schemeClr>
-          </a:lnRef>
-          <a:fillRef idx="1">
-            <a:schemeClr val="accent1"/>
-          </a:fillRef>
-          <a:effectRef idx="0">
-            <a:schemeClr val="accent1"/>
-          </a:effectRef>
-          <a:fontRef idx="minor">
-            <a:schemeClr val="lt1"/>
-          </a:fontRef>
-        </p:style>
-        <p:txBody>
-          <a:bodyPr rtlCol="0" anchor="ctr"/>
-          <a:lstStyle/>
-          <a:p>
-            <a:pPr algn="ctr"/>
-            <a:endParaRPr lang="en-GB" dirty="0">
-              <a:solidFill>
-                <a:schemeClr val="tx1"/>
-              </a:solidFill>
-            </a:endParaRPr>
-          </a:p>
-        </p:txBody>
-      </p:sp>
-      <p:sp>
-        <p:nvSpPr>
-          <p:cNvPr id="46" name="Rounded Rectangle 45"/>
-          <p:cNvSpPr/>
-          <p:nvPr/>
-        </p:nvSpPr>
-        <p:spPr>
-          <a:xfrm>
-            <a:off x="762000" y="1676400"/>
-            <a:ext cx="3429000" cy="1905000"/>
-          </a:xfrm>
-          <a:prstGeom prst="roundRect">
-            <a:avLst>
-              <a:gd name="adj" fmla="val 11443"/>
-            </a:avLst>
-          </a:prstGeom>
-          <a:solidFill>
-            <a:schemeClr val="bg1"/>
-          </a:solidFill>
-          <a:ln>
-            <a:solidFill>
-              <a:schemeClr val="tx1"/>
-            </a:solidFill>
-          </a:ln>
-        </p:spPr>
-        <p:style>
-          <a:lnRef idx="2">
-            <a:schemeClr val="accent1">
-              <a:shade val="50000"/>
-            </a:schemeClr>
-          </a:lnRef>
-          <a:fillRef idx="1">
-            <a:schemeClr val="accent1"/>
-          </a:fillRef>
-          <a:effectRef idx="0">
-            <a:schemeClr val="accent1"/>
-          </a:effectRef>
-          <a:fontRef idx="minor">
-            <a:schemeClr val="lt1"/>
-          </a:fontRef>
-        </p:style>
-        <p:txBody>
-          <a:bodyPr rtlCol="0" anchor="ctr"/>
-          <a:lstStyle/>
-          <a:p>
-            <a:pPr algn="ctr"/>
-            <a:endParaRPr lang="en-GB" dirty="0">
-              <a:solidFill>
-                <a:schemeClr val="tx1"/>
-              </a:solidFill>
-            </a:endParaRPr>
-          </a:p>
-        </p:txBody>
-      </p:sp>
-      <p:sp>
-        <p:nvSpPr>
-          <p:cNvPr id="44" name="Rounded Rectangle 43"/>
-          <p:cNvSpPr/>
-          <p:nvPr/>
-        </p:nvSpPr>
-        <p:spPr>
-          <a:xfrm>
-            <a:off x="5562600" y="4495800"/>
-            <a:ext cx="2362200" cy="762000"/>
+          <p:cNvPr id="48" name="Rounded Rectangle 47"/>
+          <p:cNvSpPr/>
+          <p:nvPr/>
+        </p:nvSpPr>
+        <p:spPr>
+          <a:xfrm>
+            <a:off x="1066800" y="6019800"/>
+            <a:ext cx="2895600" cy="381000"/>
           </a:xfrm>
           <a:prstGeom prst="roundRect">
             <a:avLst/>
@@ -6316,7 +6164,7 @@
             <a:pPr algn="ctr"/>
             <a:r>
               <a:rPr lang="en-GB" dirty="0" smtClean="0"/>
-              <a:t>[3]</a:t>
+              <a:t>[1]</a:t>
             </a:r>
             <a:endParaRPr lang="en-GB" dirty="0"/>
           </a:p>
@@ -6324,14 +6172,95 @@
       </p:sp>
       <p:sp>
         <p:nvSpPr>
-          <p:cNvPr id="47" name="Rounded Rectangle 46"/>
-          <p:cNvSpPr/>
-          <p:nvPr/>
-        </p:nvSpPr>
-        <p:spPr>
-          <a:xfrm>
-            <a:off x="5105400" y="6096000"/>
-            <a:ext cx="3505200" cy="381000"/>
+          <p:cNvPr id="39" name="Rounded Rectangle 38"/>
+          <p:cNvSpPr/>
+          <p:nvPr/>
+        </p:nvSpPr>
+        <p:spPr>
+          <a:xfrm>
+            <a:off x="1066800" y="2133600"/>
+            <a:ext cx="2895600" cy="1219200"/>
+          </a:xfrm>
+          <a:prstGeom prst="roundRect">
+            <a:avLst/>
+          </a:prstGeom>
+          <a:solidFill>
+            <a:schemeClr val="bg1"/>
+          </a:solidFill>
+          <a:ln>
+            <a:solidFill>
+              <a:schemeClr val="tx1"/>
+            </a:solidFill>
+          </a:ln>
+        </p:spPr>
+        <p:style>
+          <a:lnRef idx="2">
+            <a:schemeClr val="accent1">
+              <a:shade val="50000"/>
+            </a:schemeClr>
+          </a:lnRef>
+          <a:fillRef idx="1">
+            <a:schemeClr val="accent1"/>
+          </a:fillRef>
+          <a:effectRef idx="0">
+            <a:schemeClr val="accent1"/>
+          </a:effectRef>
+          <a:fontRef idx="minor">
+            <a:schemeClr val="lt1"/>
+          </a:fontRef>
+        </p:style>
+        <p:txBody>
+          <a:bodyPr rtlCol="0" anchor="ctr"/>
+          <a:lstStyle/>
+          <a:p>
+            <a:pPr algn="ctr"/>
+            <a:endParaRPr lang="en-GB" dirty="0">
+              <a:solidFill>
+                <a:schemeClr val="tx1"/>
+              </a:solidFill>
+            </a:endParaRPr>
+          </a:p>
+        </p:txBody>
+      </p:sp>
+      <p:sp>
+        <p:nvSpPr>
+          <p:cNvPr id="40" name="Rectangle 39"/>
+          <p:cNvSpPr/>
+          <p:nvPr/>
+        </p:nvSpPr>
+        <p:spPr>
+          <a:xfrm>
+            <a:off x="1089656" y="1764268"/>
+            <a:ext cx="1760290" cy="369332"/>
+          </a:xfrm>
+          <a:prstGeom prst="rect">
+            <a:avLst/>
+          </a:prstGeom>
+        </p:spPr>
+        <p:txBody>
+          <a:bodyPr wrap="none">
+            <a:spAutoFit/>
+          </a:bodyPr>
+          <a:lstStyle/>
+          <a:p>
+            <a:r>
+              <a:rPr lang="en-GB" dirty="0" smtClean="0"/>
+              <a:t>DigitalDocument</a:t>
+            </a:r>
+            <a:endParaRPr lang="en-GB" dirty="0"/>
+          </a:p>
+        </p:txBody>
+      </p:sp>
+      <p:sp>
+        <p:nvSpPr>
+          <p:cNvPr id="41" name="Rounded Rectangle 40"/>
+          <p:cNvSpPr/>
+          <p:nvPr/>
+        </p:nvSpPr>
+        <p:spPr>
+          <a:xfrm>
+            <a:off x="1295400" y="2373868"/>
+            <a:ext cx="2362200" cy="762000"/>
           </a:xfrm>
           <a:prstGeom prst="roundRect">
             <a:avLst/>
@@ -6371,7 +6300,7 @@
             <a:pPr algn="ctr"/>
             <a:r>
               <a:rPr lang="en-GB" dirty="0" smtClean="0"/>
-              <a:t>[2]</a:t>
+              <a:t>[3]</a:t>
             </a:r>
             <a:endParaRPr lang="en-GB" dirty="0"/>
           </a:p>
@@ -6379,14 +6308,460 @@
       </p:sp>
       <p:sp>
         <p:nvSpPr>
-          <p:cNvPr id="48" name="Rounded Rectangle 47"/>
-          <p:cNvSpPr/>
-          <p:nvPr/>
-        </p:nvSpPr>
-        <p:spPr>
-          <a:xfrm>
-            <a:off x="1066800" y="6019800"/>
-            <a:ext cx="2895600" cy="381000"/>
+          <p:cNvPr id="25" name="Rounded Rectangle 24"/>
+          <p:cNvSpPr/>
+          <p:nvPr/>
+        </p:nvSpPr>
+        <p:spPr>
+          <a:xfrm>
+            <a:off x="4876800" y="1219200"/>
+            <a:ext cx="3962400" cy="5486400"/>
+          </a:xfrm>
+          <a:prstGeom prst="roundRect">
+            <a:avLst>
+              <a:gd name="adj" fmla="val 5978"/>
+            </a:avLst>
+          </a:prstGeom>
+          <a:solidFill>
+            <a:schemeClr val="bg1"/>
+          </a:solidFill>
+          <a:ln>
+            <a:solidFill>
+              <a:schemeClr val="tx1"/>
+            </a:solidFill>
+          </a:ln>
+        </p:spPr>
+        <p:style>
+          <a:lnRef idx="2">
+            <a:schemeClr val="accent1">
+              <a:shade val="50000"/>
+            </a:schemeClr>
+          </a:lnRef>
+          <a:fillRef idx="1">
+            <a:schemeClr val="accent1"/>
+          </a:fillRef>
+          <a:effectRef idx="0">
+            <a:schemeClr val="accent1"/>
+          </a:effectRef>
+          <a:fontRef idx="minor">
+            <a:schemeClr val="lt1"/>
+          </a:fontRef>
+        </p:style>
+        <p:txBody>
+          <a:bodyPr rtlCol="0" anchor="ctr"/>
+          <a:lstStyle/>
+          <a:p>
+            <a:pPr algn="ctr"/>
+            <a:endParaRPr lang="en-GB" dirty="0">
+              <a:solidFill>
+                <a:schemeClr val="tx1"/>
+              </a:solidFill>
+            </a:endParaRPr>
+          </a:p>
+        </p:txBody>
+      </p:sp>
+      <p:sp>
+        <p:nvSpPr>
+          <p:cNvPr id="35" name="Rectangle 34"/>
+          <p:cNvSpPr/>
+          <p:nvPr/>
+        </p:nvSpPr>
+        <p:spPr>
+          <a:xfrm>
+            <a:off x="5048836" y="838200"/>
+            <a:ext cx="2342564" cy="369332"/>
+          </a:xfrm>
+          <a:prstGeom prst="rect">
+            <a:avLst/>
+          </a:prstGeom>
+        </p:spPr>
+        <p:txBody>
+          <a:bodyPr wrap="square">
+            <a:spAutoFit/>
+          </a:bodyPr>
+          <a:lstStyle/>
+          <a:p>
+            <a:r>
+              <a:rPr lang="en-GB" dirty="0" smtClean="0"/>
+              <a:t>BigraphSpaceAuthored</a:t>
+            </a:r>
+            <a:endParaRPr lang="en-GB" dirty="0"/>
+          </a:p>
+        </p:txBody>
+      </p:sp>
+      <p:sp>
+        <p:nvSpPr>
+          <p:cNvPr id="36" name="Rounded Rectangle 35"/>
+          <p:cNvSpPr/>
+          <p:nvPr/>
+        </p:nvSpPr>
+        <p:spPr>
+          <a:xfrm>
+            <a:off x="5105400" y="1676400"/>
+            <a:ext cx="3429000" cy="4114800"/>
+          </a:xfrm>
+          <a:prstGeom prst="roundRect">
+            <a:avLst>
+              <a:gd name="adj" fmla="val 6560"/>
+            </a:avLst>
+          </a:prstGeom>
+          <a:solidFill>
+            <a:schemeClr val="bg1"/>
+          </a:solidFill>
+          <a:ln cmpd="dbl">
+            <a:solidFill>
+              <a:schemeClr val="tx1"/>
+            </a:solidFill>
+          </a:ln>
+        </p:spPr>
+        <p:style>
+          <a:lnRef idx="2">
+            <a:schemeClr val="accent1">
+              <a:shade val="50000"/>
+            </a:schemeClr>
+          </a:lnRef>
+          <a:fillRef idx="1">
+            <a:schemeClr val="accent1"/>
+          </a:fillRef>
+          <a:effectRef idx="0">
+            <a:schemeClr val="accent1"/>
+          </a:effectRef>
+          <a:fontRef idx="minor">
+            <a:schemeClr val="lt1"/>
+          </a:fontRef>
+        </p:style>
+        <p:txBody>
+          <a:bodyPr rtlCol="0" anchor="ctr"/>
+          <a:lstStyle/>
+          <a:p>
+            <a:pPr algn="ctr"/>
+            <a:endParaRPr lang="en-GB" dirty="0">
+              <a:solidFill>
+                <a:schemeClr val="tx1"/>
+              </a:solidFill>
+            </a:endParaRPr>
+          </a:p>
+        </p:txBody>
+      </p:sp>
+      <p:sp>
+        <p:nvSpPr>
+          <p:cNvPr id="42" name="Rectangle 41"/>
+          <p:cNvSpPr/>
+          <p:nvPr/>
+        </p:nvSpPr>
+        <p:spPr>
+          <a:xfrm>
+            <a:off x="5204456" y="1295400"/>
+            <a:ext cx="1805944" cy="369332"/>
+          </a:xfrm>
+          <a:prstGeom prst="rect">
+            <a:avLst/>
+          </a:prstGeom>
+        </p:spPr>
+        <p:txBody>
+          <a:bodyPr wrap="none">
+            <a:spAutoFit/>
+          </a:bodyPr>
+          <a:lstStyle/>
+          <a:p>
+            <a:r>
+              <a:rPr lang="en-GB" dirty="0" smtClean="0"/>
+              <a:t>DescriptionRoom</a:t>
+            </a:r>
+            <a:endParaRPr lang="en-GB" dirty="0"/>
+          </a:p>
+        </p:txBody>
+      </p:sp>
+      <p:sp>
+        <p:nvSpPr>
+          <p:cNvPr id="43" name="Rounded Rectangle 42"/>
+          <p:cNvSpPr/>
+          <p:nvPr/>
+        </p:nvSpPr>
+        <p:spPr>
+          <a:xfrm>
+            <a:off x="5334000" y="2121932"/>
+            <a:ext cx="2895600" cy="1764268"/>
+          </a:xfrm>
+          <a:prstGeom prst="roundRect">
+            <a:avLst>
+              <a:gd name="adj" fmla="val 9705"/>
+            </a:avLst>
+          </a:prstGeom>
+          <a:solidFill>
+            <a:schemeClr val="bg1"/>
+          </a:solidFill>
+          <a:ln>
+            <a:solidFill>
+              <a:schemeClr val="tx1"/>
+            </a:solidFill>
+          </a:ln>
+        </p:spPr>
+        <p:style>
+          <a:lnRef idx="2">
+            <a:schemeClr val="accent1">
+              <a:shade val="50000"/>
+            </a:schemeClr>
+          </a:lnRef>
+          <a:fillRef idx="1">
+            <a:schemeClr val="accent1"/>
+          </a:fillRef>
+          <a:effectRef idx="0">
+            <a:schemeClr val="accent1"/>
+          </a:effectRef>
+          <a:fontRef idx="minor">
+            <a:schemeClr val="lt1"/>
+          </a:fontRef>
+        </p:style>
+        <p:txBody>
+          <a:bodyPr rtlCol="0" anchor="ctr"/>
+          <a:lstStyle/>
+          <a:p>
+            <a:pPr algn="ctr"/>
+            <a:endParaRPr lang="en-GB" dirty="0">
+              <a:solidFill>
+                <a:schemeClr val="tx1"/>
+              </a:solidFill>
+            </a:endParaRPr>
+          </a:p>
+        </p:txBody>
+      </p:sp>
+      <p:sp>
+        <p:nvSpPr>
+          <p:cNvPr id="49" name="Rectangle 48"/>
+          <p:cNvSpPr/>
+          <p:nvPr/>
+        </p:nvSpPr>
+        <p:spPr>
+          <a:xfrm>
+            <a:off x="5356856" y="1752600"/>
+            <a:ext cx="2188741" cy="369332"/>
+          </a:xfrm>
+          <a:prstGeom prst="rect">
+            <a:avLst/>
+          </a:prstGeom>
+        </p:spPr>
+        <p:txBody>
+          <a:bodyPr wrap="none">
+            <a:spAutoFit/>
+          </a:bodyPr>
+          <a:lstStyle/>
+          <a:p>
+            <a:r>
+              <a:rPr lang="en-GB" dirty="0" smtClean="0"/>
+              <a:t>DescriptionBluetooth</a:t>
+            </a:r>
+            <a:endParaRPr lang="en-GB" dirty="0"/>
+          </a:p>
+        </p:txBody>
+      </p:sp>
+      <p:sp>
+        <p:nvSpPr>
+          <p:cNvPr id="50" name="Rounded Rectangle 49"/>
+          <p:cNvSpPr/>
+          <p:nvPr/>
+        </p:nvSpPr>
+        <p:spPr>
+          <a:xfrm>
+            <a:off x="5486400" y="2502932"/>
+            <a:ext cx="2514600" cy="685800"/>
+          </a:xfrm>
+          <a:prstGeom prst="roundRect">
+            <a:avLst/>
+          </a:prstGeom>
+          <a:solidFill>
+            <a:schemeClr val="bg1"/>
+          </a:solidFill>
+          <a:ln>
+            <a:solidFill>
+              <a:schemeClr val="tx1"/>
+            </a:solidFill>
+            <a:prstDash val="sysDot"/>
+          </a:ln>
+        </p:spPr>
+        <p:style>
+          <a:lnRef idx="2">
+            <a:schemeClr val="accent1">
+              <a:shade val="50000"/>
+            </a:schemeClr>
+          </a:lnRef>
+          <a:fillRef idx="1">
+            <a:schemeClr val="accent1"/>
+          </a:fillRef>
+          <a:effectRef idx="0">
+            <a:schemeClr val="accent1"/>
+          </a:effectRef>
+          <a:fontRef idx="minor">
+            <a:schemeClr val="lt1"/>
+          </a:fontRef>
+        </p:style>
+        <p:txBody>
+          <a:bodyPr rtlCol="0" anchor="ctr"/>
+          <a:lstStyle/>
+          <a:p>
+            <a:pPr algn="ctr"/>
+            <a:endParaRPr lang="en-GB" dirty="0">
+              <a:solidFill>
+                <a:schemeClr val="tx1"/>
+              </a:solidFill>
+            </a:endParaRPr>
+          </a:p>
+        </p:txBody>
+      </p:sp>
+      <p:sp>
+        <p:nvSpPr>
+          <p:cNvPr id="51" name="Rectangle 50"/>
+          <p:cNvSpPr/>
+          <p:nvPr/>
+        </p:nvSpPr>
+        <p:spPr>
+          <a:xfrm>
+            <a:off x="5509256" y="2133600"/>
+            <a:ext cx="933461" cy="369332"/>
+          </a:xfrm>
+          <a:prstGeom prst="rect">
+            <a:avLst/>
+          </a:prstGeom>
+        </p:spPr>
+        <p:txBody>
+          <a:bodyPr wrap="none">
+            <a:spAutoFit/>
+          </a:bodyPr>
+          <a:lstStyle/>
+          <a:p>
+            <a:r>
+              <a:rPr lang="en-GB" dirty="0" smtClean="0"/>
+              <a:t>Address</a:t>
+            </a:r>
+            <a:endParaRPr lang="en-GB" dirty="0"/>
+          </a:p>
+        </p:txBody>
+      </p:sp>
+      <p:sp>
+        <p:nvSpPr>
+          <p:cNvPr id="52" name="Rectangle 51"/>
+          <p:cNvSpPr/>
+          <p:nvPr/>
+        </p:nvSpPr>
+        <p:spPr>
+          <a:xfrm>
+            <a:off x="5715000" y="2655332"/>
+            <a:ext cx="2057400" cy="369332"/>
+          </a:xfrm>
+          <a:prstGeom prst="rect">
+            <a:avLst/>
+          </a:prstGeom>
+          <a:ln>
+            <a:solidFill>
+              <a:schemeClr val="tx1"/>
+            </a:solidFill>
+          </a:ln>
+        </p:spPr>
+        <p:txBody>
+          <a:bodyPr wrap="square">
+            <a:spAutoFit/>
+          </a:bodyPr>
+          <a:lstStyle/>
+          <a:p>
+            <a:r>
+              <a:rPr lang="en-GB" dirty="0" smtClean="0"/>
+              <a:t>$address:string</a:t>
+            </a:r>
+            <a:endParaRPr lang="en-GB" dirty="0"/>
+          </a:p>
+        </p:txBody>
+      </p:sp>
+      <p:sp>
+        <p:nvSpPr>
+          <p:cNvPr id="53" name="Rounded Rectangle 52"/>
+          <p:cNvSpPr/>
+          <p:nvPr/>
+        </p:nvSpPr>
+        <p:spPr>
+          <a:xfrm>
+            <a:off x="5334000" y="4343400"/>
+            <a:ext cx="2895600" cy="1131332"/>
+          </a:xfrm>
+          <a:prstGeom prst="roundRect">
+            <a:avLst/>
+          </a:prstGeom>
+          <a:solidFill>
+            <a:schemeClr val="bg1"/>
+          </a:solidFill>
+          <a:ln>
+            <a:solidFill>
+              <a:schemeClr val="tx1"/>
+            </a:solidFill>
+          </a:ln>
+        </p:spPr>
+        <p:style>
+          <a:lnRef idx="2">
+            <a:schemeClr val="accent1">
+              <a:shade val="50000"/>
+            </a:schemeClr>
+          </a:lnRef>
+          <a:fillRef idx="1">
+            <a:schemeClr val="accent1"/>
+          </a:fillRef>
+          <a:effectRef idx="0">
+            <a:schemeClr val="accent1"/>
+          </a:effectRef>
+          <a:fontRef idx="minor">
+            <a:schemeClr val="lt1"/>
+          </a:fontRef>
+        </p:style>
+        <p:txBody>
+          <a:bodyPr rtlCol="0" anchor="ctr"/>
+          <a:lstStyle/>
+          <a:p>
+            <a:pPr algn="ctr"/>
+            <a:endParaRPr lang="en-GB" dirty="0">
+              <a:solidFill>
+                <a:schemeClr val="tx1"/>
+              </a:solidFill>
+            </a:endParaRPr>
+          </a:p>
+        </p:txBody>
+      </p:sp>
+      <p:sp>
+        <p:nvSpPr>
+          <p:cNvPr id="54" name="Rectangle 53"/>
+          <p:cNvSpPr/>
+          <p:nvPr/>
+        </p:nvSpPr>
+        <p:spPr>
+          <a:xfrm>
+            <a:off x="5356856" y="3974068"/>
+            <a:ext cx="1760290" cy="369332"/>
+          </a:xfrm>
+          <a:prstGeom prst="rect">
+            <a:avLst/>
+          </a:prstGeom>
+        </p:spPr>
+        <p:txBody>
+          <a:bodyPr wrap="none">
+            <a:spAutoFit/>
+          </a:bodyPr>
+          <a:lstStyle/>
+          <a:p>
+            <a:r>
+              <a:rPr lang="en-GB" dirty="0" smtClean="0"/>
+              <a:t>DigitalDocument</a:t>
+            </a:r>
+            <a:endParaRPr lang="en-GB" dirty="0"/>
+          </a:p>
+        </p:txBody>
+      </p:sp>
+      <p:sp>
+        <p:nvSpPr>
+          <p:cNvPr id="55" name="Rounded Rectangle 54"/>
+          <p:cNvSpPr/>
+          <p:nvPr/>
+        </p:nvSpPr>
+        <p:spPr>
+          <a:xfrm>
+            <a:off x="5562600" y="4572000"/>
+            <a:ext cx="2362200" cy="685800"/>
           </a:xfrm>
           <a:prstGeom prst="roundRect">
             <a:avLst/>
@@ -6426,7 +6801,7 @@
             <a:pPr algn="ctr"/>
             <a:r>
               <a:rPr lang="en-GB" dirty="0" smtClean="0"/>
-              <a:t>[1]</a:t>
+              <a:t>[3]</a:t>
             </a:r>
             <a:endParaRPr lang="en-GB" dirty="0"/>
           </a:p>
@@ -6434,95 +6809,14 @@
       </p:sp>
       <p:sp>
         <p:nvSpPr>
-          <p:cNvPr id="39" name="Rounded Rectangle 38"/>
-          <p:cNvSpPr/>
-          <p:nvPr/>
-        </p:nvSpPr>
-        <p:spPr>
-          <a:xfrm>
-            <a:off x="1066800" y="2133600"/>
-            <a:ext cx="2895600" cy="1219200"/>
-          </a:xfrm>
-          <a:prstGeom prst="roundRect">
-            <a:avLst/>
-          </a:prstGeom>
-          <a:solidFill>
-            <a:schemeClr val="bg1"/>
-          </a:solidFill>
-          <a:ln>
-            <a:solidFill>
-              <a:schemeClr val="tx1"/>
-            </a:solidFill>
-          </a:ln>
-        </p:spPr>
-        <p:style>
-          <a:lnRef idx="2">
-            <a:schemeClr val="accent1">
-              <a:shade val="50000"/>
-            </a:schemeClr>
-          </a:lnRef>
-          <a:fillRef idx="1">
-            <a:schemeClr val="accent1"/>
-          </a:fillRef>
-          <a:effectRef idx="0">
-            <a:schemeClr val="accent1"/>
-          </a:effectRef>
-          <a:fontRef idx="minor">
-            <a:schemeClr val="lt1"/>
-          </a:fontRef>
-        </p:style>
-        <p:txBody>
-          <a:bodyPr rtlCol="0" anchor="ctr"/>
-          <a:lstStyle/>
-          <a:p>
-            <a:pPr algn="ctr"/>
-            <a:endParaRPr lang="en-GB" dirty="0">
-              <a:solidFill>
-                <a:schemeClr val="tx1"/>
-              </a:solidFill>
-            </a:endParaRPr>
-          </a:p>
-        </p:txBody>
-      </p:sp>
-      <p:sp>
-        <p:nvSpPr>
-          <p:cNvPr id="40" name="Rectangle 39"/>
-          <p:cNvSpPr/>
-          <p:nvPr/>
-        </p:nvSpPr>
-        <p:spPr>
-          <a:xfrm>
-            <a:off x="1089656" y="1764268"/>
-            <a:ext cx="1760290" cy="369332"/>
-          </a:xfrm>
-          <a:prstGeom prst="rect">
-            <a:avLst/>
-          </a:prstGeom>
-        </p:spPr>
-        <p:txBody>
-          <a:bodyPr wrap="none">
-            <a:spAutoFit/>
-          </a:bodyPr>
-          <a:lstStyle/>
-          <a:p>
-            <a:r>
-              <a:rPr lang="en-GB" dirty="0" smtClean="0"/>
-              <a:t>DigitalDocument</a:t>
-            </a:r>
-            <a:endParaRPr lang="en-GB" dirty="0"/>
-          </a:p>
-        </p:txBody>
-      </p:sp>
-      <p:sp>
-        <p:nvSpPr>
-          <p:cNvPr id="41" name="Rounded Rectangle 40"/>
-          <p:cNvSpPr/>
-          <p:nvPr/>
-        </p:nvSpPr>
-        <p:spPr>
-          <a:xfrm>
-            <a:off x="1295400" y="2373868"/>
-            <a:ext cx="2362200" cy="762000"/>
+          <p:cNvPr id="56" name="Rounded Rectangle 55"/>
+          <p:cNvSpPr/>
+          <p:nvPr/>
+        </p:nvSpPr>
+        <p:spPr>
+          <a:xfrm>
+            <a:off x="5105400" y="6096000"/>
+            <a:ext cx="3505200" cy="381000"/>
           </a:xfrm>
           <a:prstGeom prst="roundRect">
             <a:avLst/>
@@ -6562,7 +6856,62 @@
             <a:pPr algn="ctr"/>
             <a:r>
               <a:rPr lang="en-GB" dirty="0" smtClean="0"/>
-              <a:t>[3]</a:t>
+              <a:t>[2]</a:t>
+            </a:r>
+            <a:endParaRPr lang="en-GB" dirty="0"/>
+          </a:p>
+        </p:txBody>
+      </p:sp>
+      <p:sp>
+        <p:nvSpPr>
+          <p:cNvPr id="57" name="Rounded Rectangle 56"/>
+          <p:cNvSpPr/>
+          <p:nvPr/>
+        </p:nvSpPr>
+        <p:spPr>
+          <a:xfrm>
+            <a:off x="5486400" y="3352800"/>
+            <a:ext cx="2514600" cy="381000"/>
+          </a:xfrm>
+          <a:prstGeom prst="roundRect">
+            <a:avLst/>
+          </a:prstGeom>
+          <a:solidFill>
+            <a:schemeClr val="bg1">
+              <a:lumMod val="65000"/>
+            </a:schemeClr>
+          </a:solidFill>
+          <a:ln>
+            <a:solidFill>
+              <a:schemeClr val="tx1"/>
+            </a:solidFill>
+            <a:prstDash val="sysDash"/>
+          </a:ln>
+        </p:spPr>
+        <p:style>
+          <a:lnRef idx="2">
+            <a:schemeClr val="accent1">
+              <a:shade val="50000"/>
+            </a:schemeClr>
+          </a:lnRef>
+          <a:fillRef idx="1">
+            <a:schemeClr val="accent1"/>
+          </a:fillRef>
+          <a:effectRef idx="0">
+            <a:schemeClr val="accent1"/>
+          </a:effectRef>
+          <a:fontRef idx="minor">
+            <a:schemeClr val="lt1"/>
+          </a:fontRef>
+        </p:style>
+        <p:txBody>
+          <a:bodyPr rtlCol="0" anchor="ctr"/>
+          <a:lstStyle/>
+          <a:p>
+            <a:pPr algn="ctr"/>
+            <a:r>
+              <a:rPr lang="en-GB" dirty="0" smtClean="0"/>
+              <a:t>[5]</a:t>
             </a:r>
             <a:endParaRPr lang="en-GB" dirty="0"/>
           </a:p>
@@ -6602,7 +6951,7 @@
         <p:spPr>
           <a:xfrm>
             <a:off x="762000" y="2438400"/>
-            <a:ext cx="3429000" cy="2590800"/>
+            <a:ext cx="3429000" cy="3276600"/>
           </a:xfrm>
           <a:prstGeom prst="roundRect">
             <a:avLst>
@@ -6767,10 +7116,12 @@
         <p:spPr>
           <a:xfrm>
             <a:off x="1066800" y="2907268"/>
-            <a:ext cx="2895600" cy="1219200"/>
+            <a:ext cx="2895600" cy="1893332"/>
           </a:xfrm>
           <a:prstGeom prst="roundRect">
-            <a:avLst/>
+            <a:avLst>
+              <a:gd name="adj" fmla="val 10180"/>
+            </a:avLst>
           </a:prstGeom>
           <a:solidFill>
             <a:schemeClr val="bg1"/>
@@ -6963,7 +7314,7 @@
         </p:nvSpPr>
         <p:spPr>
           <a:xfrm>
-            <a:off x="1219200" y="4343400"/>
+            <a:off x="1219200" y="5029200"/>
             <a:ext cx="2438400" cy="457200"/>
           </a:xfrm>
           <a:prstGeom prst="roundRect">
@@ -7051,7 +7402,7 @@
         <p:spPr>
           <a:xfrm>
             <a:off x="5029200" y="2438400"/>
-            <a:ext cx="3429000" cy="2590800"/>
+            <a:ext cx="3429000" cy="3276600"/>
           </a:xfrm>
           <a:prstGeom prst="roundRect">
             <a:avLst>
@@ -7104,7 +7455,7 @@
         </p:nvSpPr>
         <p:spPr>
           <a:xfrm>
-            <a:off x="5486400" y="4343400"/>
+            <a:off x="5486400" y="5029200"/>
             <a:ext cx="2438400" cy="457200"/>
           </a:xfrm>
           <a:prstGeom prst="roundRect">
@@ -7146,6 +7497,61 @@
             <a:r>
               <a:rPr lang="en-GB" dirty="0" smtClean="0"/>
               <a:t>[1]</a:t>
+            </a:r>
+            <a:endParaRPr lang="en-GB" dirty="0"/>
+          </a:p>
+        </p:txBody>
+      </p:sp>
+      <p:sp>
+        <p:nvSpPr>
+          <p:cNvPr id="18" name="Rounded Rectangle 17"/>
+          <p:cNvSpPr/>
+          <p:nvPr/>
+        </p:nvSpPr>
+        <p:spPr>
+          <a:xfrm>
+            <a:off x="1219200" y="4114800"/>
+            <a:ext cx="2438400" cy="457200"/>
+          </a:xfrm>
+          <a:prstGeom prst="roundRect">
+            <a:avLst/>
+          </a:prstGeom>
+          <a:solidFill>
+            <a:schemeClr val="bg1">
+              <a:lumMod val="65000"/>
+            </a:schemeClr>
+          </a:solidFill>
+          <a:ln>
+            <a:solidFill>
+              <a:schemeClr val="tx1"/>
+            </a:solidFill>
+            <a:prstDash val="sysDash"/>
+          </a:ln>
+        </p:spPr>
+        <p:style>
+          <a:lnRef idx="2">
+            <a:schemeClr val="accent1">
+              <a:shade val="50000"/>
+            </a:schemeClr>
+          </a:lnRef>
+          <a:fillRef idx="1">
+            <a:schemeClr val="accent1"/>
+          </a:fillRef>
+          <a:effectRef idx="0">
+            <a:schemeClr val="accent1"/>
+          </a:effectRef>
+          <a:fontRef idx="minor">
+            <a:schemeClr val="lt1"/>
+          </a:fontRef>
+        </p:style>
+        <p:txBody>
+          <a:bodyPr rtlCol="0" anchor="ctr"/>
+          <a:lstStyle/>
+          <a:p>
+            <a:pPr algn="ctr"/>
+            <a:r>
+              <a:rPr lang="en-GB" dirty="0" smtClean="0"/>
+              <a:t>[2]</a:t>
             </a:r>
             <a:endParaRPr lang="en-GB" dirty="0"/>
           </a:p>

</xml_diff>